<commit_message>
Final Commit as published in Linkedin
</commit_message>
<xml_diff>
--- a/Nuovo Presentazione di Microsoft PowerPoint.pptx
+++ b/Nuovo Presentazione di Microsoft PowerPoint.pptx
@@ -14,6 +14,7 @@
     <p:sldId id="262" r:id="rId8"/>
     <p:sldId id="264" r:id="rId9"/>
     <p:sldId id="263" r:id="rId10"/>
+    <p:sldId id="265" r:id="rId11"/>
   </p:sldIdLst>
   <p:sldSz cx="12192000" cy="6858000"/>
   <p:notesSz cx="6858000" cy="9144000"/>
@@ -249,7 +250,7 @@
           <a:p>
             <a:fld id="{6BD15808-8B7D-4DE2-9E62-06EEBAEB5E54}" type="datetimeFigureOut">
               <a:rPr lang="it-IT" smtClean="0"/>
-              <a:t>05/04/2017</a:t>
+              <a:t>07/04/2017</a:t>
             </a:fld>
             <a:endParaRPr lang="it-IT"/>
           </a:p>
@@ -417,7 +418,7 @@
           <a:p>
             <a:fld id="{6BD15808-8B7D-4DE2-9E62-06EEBAEB5E54}" type="datetimeFigureOut">
               <a:rPr lang="it-IT" smtClean="0"/>
-              <a:t>05/04/2017</a:t>
+              <a:t>07/04/2017</a:t>
             </a:fld>
             <a:endParaRPr lang="it-IT"/>
           </a:p>
@@ -595,7 +596,7 @@
           <a:p>
             <a:fld id="{6BD15808-8B7D-4DE2-9E62-06EEBAEB5E54}" type="datetimeFigureOut">
               <a:rPr lang="it-IT" smtClean="0"/>
-              <a:t>05/04/2017</a:t>
+              <a:t>07/04/2017</a:t>
             </a:fld>
             <a:endParaRPr lang="it-IT"/>
           </a:p>
@@ -763,7 +764,7 @@
           <a:p>
             <a:fld id="{6BD15808-8B7D-4DE2-9E62-06EEBAEB5E54}" type="datetimeFigureOut">
               <a:rPr lang="it-IT" smtClean="0"/>
-              <a:t>05/04/2017</a:t>
+              <a:t>07/04/2017</a:t>
             </a:fld>
             <a:endParaRPr lang="it-IT"/>
           </a:p>
@@ -1008,7 +1009,7 @@
           <a:p>
             <a:fld id="{6BD15808-8B7D-4DE2-9E62-06EEBAEB5E54}" type="datetimeFigureOut">
               <a:rPr lang="it-IT" smtClean="0"/>
-              <a:t>05/04/2017</a:t>
+              <a:t>07/04/2017</a:t>
             </a:fld>
             <a:endParaRPr lang="it-IT"/>
           </a:p>
@@ -1237,7 +1238,7 @@
           <a:p>
             <a:fld id="{6BD15808-8B7D-4DE2-9E62-06EEBAEB5E54}" type="datetimeFigureOut">
               <a:rPr lang="it-IT" smtClean="0"/>
-              <a:t>05/04/2017</a:t>
+              <a:t>07/04/2017</a:t>
             </a:fld>
             <a:endParaRPr lang="it-IT"/>
           </a:p>
@@ -1601,7 +1602,7 @@
           <a:p>
             <a:fld id="{6BD15808-8B7D-4DE2-9E62-06EEBAEB5E54}" type="datetimeFigureOut">
               <a:rPr lang="it-IT" smtClean="0"/>
-              <a:t>05/04/2017</a:t>
+              <a:t>07/04/2017</a:t>
             </a:fld>
             <a:endParaRPr lang="it-IT"/>
           </a:p>
@@ -1718,7 +1719,7 @@
           <a:p>
             <a:fld id="{6BD15808-8B7D-4DE2-9E62-06EEBAEB5E54}" type="datetimeFigureOut">
               <a:rPr lang="it-IT" smtClean="0"/>
-              <a:t>05/04/2017</a:t>
+              <a:t>07/04/2017</a:t>
             </a:fld>
             <a:endParaRPr lang="it-IT"/>
           </a:p>
@@ -1813,7 +1814,7 @@
           <a:p>
             <a:fld id="{6BD15808-8B7D-4DE2-9E62-06EEBAEB5E54}" type="datetimeFigureOut">
               <a:rPr lang="it-IT" smtClean="0"/>
-              <a:t>05/04/2017</a:t>
+              <a:t>07/04/2017</a:t>
             </a:fld>
             <a:endParaRPr lang="it-IT"/>
           </a:p>
@@ -2088,7 +2089,7 @@
           <a:p>
             <a:fld id="{6BD15808-8B7D-4DE2-9E62-06EEBAEB5E54}" type="datetimeFigureOut">
               <a:rPr lang="it-IT" smtClean="0"/>
-              <a:t>05/04/2017</a:t>
+              <a:t>07/04/2017</a:t>
             </a:fld>
             <a:endParaRPr lang="it-IT"/>
           </a:p>
@@ -2340,7 +2341,7 @@
           <a:p>
             <a:fld id="{6BD15808-8B7D-4DE2-9E62-06EEBAEB5E54}" type="datetimeFigureOut">
               <a:rPr lang="it-IT" smtClean="0"/>
-              <a:t>05/04/2017</a:t>
+              <a:t>07/04/2017</a:t>
             </a:fld>
             <a:endParaRPr lang="it-IT"/>
           </a:p>
@@ -2551,7 +2552,7 @@
           <a:p>
             <a:fld id="{6BD15808-8B7D-4DE2-9E62-06EEBAEB5E54}" type="datetimeFigureOut">
               <a:rPr lang="it-IT" smtClean="0"/>
-              <a:t>05/04/2017</a:t>
+              <a:t>07/04/2017</a:t>
             </a:fld>
             <a:endParaRPr lang="it-IT"/>
           </a:p>
@@ -2998,6 +2999,94 @@
     <p:extLst>
       <p:ext uri="{BB962C8B-B14F-4D97-AF65-F5344CB8AC3E}">
         <p14:creationId xmlns:p14="http://schemas.microsoft.com/office/powerpoint/2010/main" val="1640797270"/>
+      </p:ext>
+    </p:extLst>
+  </p:cSld>
+  <p:clrMapOvr>
+    <a:masterClrMapping/>
+  </p:clrMapOvr>
+</p:sld>
+</file>
+
+<file path=ppt/slides/slide10.xml><?xml version="1.0" encoding="utf-8"?>
+<p:sld xmlns:a="http://schemas.openxmlformats.org/drawingml/2006/main" xmlns:r="http://schemas.openxmlformats.org/officeDocument/2006/relationships" xmlns:p="http://schemas.openxmlformats.org/presentationml/2006/main">
+  <p:cSld>
+    <p:spTree>
+      <p:nvGrpSpPr>
+        <p:cNvPr id="1" name=""/>
+        <p:cNvGrpSpPr/>
+        <p:nvPr/>
+      </p:nvGrpSpPr>
+      <p:grpSpPr>
+        <a:xfrm>
+          <a:off x="0" y="0"/>
+          <a:ext cx="0" cy="0"/>
+          <a:chOff x="0" y="0"/>
+          <a:chExt cx="0" cy="0"/>
+        </a:xfrm>
+      </p:grpSpPr>
+      <p:pic>
+        <p:nvPicPr>
+          <p:cNvPr id="5" name="Immagine 4"/>
+          <p:cNvPicPr>
+            <a:picLocks noChangeAspect="1"/>
+          </p:cNvPicPr>
+          <p:nvPr/>
+        </p:nvPicPr>
+        <p:blipFill rotWithShape="1">
+          <a:blip r:embed="rId2">
+            <a:extLst>
+              <a:ext uri="{28A0092B-C50C-407E-A947-70E740481C1C}">
+                <a14:useLocalDpi xmlns:a14="http://schemas.microsoft.com/office/drawing/2010/main" val="0"/>
+              </a:ext>
+            </a:extLst>
+          </a:blip>
+          <a:srcRect l="8150" t="783" r="-89" b="783"/>
+          <a:stretch/>
+        </p:blipFill>
+        <p:spPr>
+          <a:xfrm>
+            <a:off x="6157608" y="622570"/>
+            <a:ext cx="5700408" cy="2880000"/>
+          </a:xfrm>
+          <a:prstGeom prst="rect">
+            <a:avLst/>
+          </a:prstGeom>
+        </p:spPr>
+      </p:pic>
+      <p:pic>
+        <p:nvPicPr>
+          <p:cNvPr id="3" name="Immagine 2"/>
+          <p:cNvPicPr>
+            <a:picLocks noChangeAspect="1"/>
+          </p:cNvPicPr>
+          <p:nvPr/>
+        </p:nvPicPr>
+        <p:blipFill rotWithShape="1">
+          <a:blip r:embed="rId3">
+            <a:extLst>
+              <a:ext uri="{28A0092B-C50C-407E-A947-70E740481C1C}">
+                <a14:useLocalDpi xmlns:a14="http://schemas.microsoft.com/office/drawing/2010/main" val="0"/>
+              </a:ext>
+            </a:extLst>
+          </a:blip>
+          <a:srcRect l="-122" t="19022" r="14565" b="545"/>
+          <a:stretch/>
+        </p:blipFill>
+        <p:spPr>
+          <a:xfrm>
+            <a:off x="1117107" y="1332995"/>
+            <a:ext cx="5917291" cy="2664000"/>
+          </a:xfrm>
+          <a:prstGeom prst="rect">
+            <a:avLst/>
+          </a:prstGeom>
+        </p:spPr>
+      </p:pic>
+    </p:spTree>
+    <p:extLst>
+      <p:ext uri="{BB962C8B-B14F-4D97-AF65-F5344CB8AC3E}">
+        <p14:creationId xmlns:p14="http://schemas.microsoft.com/office/powerpoint/2010/main" val="3579241660"/>
       </p:ext>
     </p:extLst>
   </p:cSld>

</xml_diff>